<commit_message>
Deployed 88c752d with MkDocs version: 1.1.2
</commit_message>
<xml_diff>
--- a/aulas/12-paralelismo/slides.pptx
+++ b/aulas/12-paralelismo/slides.pptx
@@ -6,7 +6,7 @@
     <p:sldMasterId id="2147483661" r:id="rId2"/>
   </p:sldMasterIdLst>
   <p:notesMasterIdLst>
-    <p:notesMasterId r:id="rId33"/>
+    <p:notesMasterId r:id="rId34"/>
   </p:notesMasterIdLst>
   <p:sldIdLst>
     <p:sldId id="256" r:id="rId6"/>
@@ -36,6 +36,7 @@
     <p:sldId id="280" r:id="rId30"/>
     <p:sldId id="281" r:id="rId31"/>
     <p:sldId id="282" r:id="rId32"/>
+    <p:sldId id="283" r:id="rId33"/>
   </p:sldIdLst>
   <p:sldSz cx="9144000" cy="6858000" type="screen4x3"/>
   <p:notesSz cx="6858000" cy="9144000"/>
@@ -19224,6 +19225,272 @@
 <file path=ppt/slides/slide27.xml><?xml version="1.0" encoding="utf-8"?>
 <p:sld xmlns:a="http://schemas.openxmlformats.org/drawingml/2006/main" xmlns:r="http://schemas.openxmlformats.org/officeDocument/2006/relationships" xmlns:p="http://schemas.openxmlformats.org/presentationml/2006/main" xmlns:m="http://schemas.openxmlformats.org/officeDocument/2006/math" xmlns:w="http://schemas.openxmlformats.org/wordprocessingml/2006/main" showMasterPhAnim="0" show="1">
   <p:cSld name="">
+    <p:spTree>
+      <p:nvGrpSpPr>
+        <p:cNvPr id="1" name="" hidden="0"/>
+        <p:cNvGrpSpPr/>
+        <p:nvPr isPhoto="0" userDrawn="0"/>
+      </p:nvGrpSpPr>
+      <p:grpSpPr bwMode="auto">
+        <a:xfrm>
+          <a:off x="0" y="0"/>
+          <a:ext cx="0" cy="0"/>
+          <a:chOff x="0" y="0"/>
+          <a:chExt cx="0" cy="0"/>
+        </a:xfrm>
+      </p:grpSpPr>
+      <p:sp>
+        <p:nvSpPr>
+          <p:cNvPr id="4" name="Google Shape;347;p64" hidden="0"/>
+          <p:cNvSpPr/>
+          <p:nvPr isPhoto="0" userDrawn="0"/>
+        </p:nvSpPr>
+        <p:spPr bwMode="auto">
+          <a:xfrm>
+            <a:off x="457200" y="2920654"/>
+            <a:ext cx="8228520" cy="618120"/>
+          </a:xfrm>
+          <a:prstGeom prst="rect">
+            <a:avLst/>
+          </a:prstGeom>
+          <a:noFill/>
+          <a:ln>
+            <a:noFill/>
+          </a:ln>
+        </p:spPr>
+        <p:txBody>
+          <a:bodyPr spcFirstLastPara="1" wrap="square" lIns="90000" tIns="45000" rIns="90000" bIns="45000" anchor="t" anchorCtr="0">
+            <a:noAutofit/>
+          </a:bodyPr>
+          <a:lstStyle/>
+          <a:p>
+            <a:pPr marL="0" marR="0" lvl="0" indent="0" algn="ctr">
+              <a:lnSpc>
+                <a:spcPct val="100000"/>
+              </a:lnSpc>
+              <a:spcBef>
+                <a:spcPts val="0"/>
+              </a:spcBef>
+              <a:spcAft>
+                <a:spcPts val="0"/>
+              </a:spcAft>
+              <a:buNone/>
+              <a:defRPr/>
+            </a:pPr>
+            <a:r>
+              <a:rPr lang="pt-BR" sz="3600" b="1" i="0" u="none" strike="noStrike" cap="none">
+                <a:solidFill>
+                  <a:srgbClr val="C00026"/>
+                </a:solidFill>
+                <a:latin typeface="Verdana"/>
+                <a:ea typeface="Verdana"/>
+                <a:cs typeface="Verdana"/>
+              </a:rPr>
+              <a:t>Atividade prática</a:t>
+            </a:r>
+            <a:endParaRPr sz="3600" b="1" i="0" u="none" strike="noStrike" cap="none">
+              <a:solidFill>
+                <a:schemeClr val="dk1"/>
+              </a:solidFill>
+              <a:latin typeface="Arial"/>
+              <a:ea typeface="Arial"/>
+              <a:cs typeface="Arial"/>
+            </a:endParaRPr>
+          </a:p>
+        </p:txBody>
+      </p:sp>
+      <p:sp>
+        <p:nvSpPr>
+          <p:cNvPr id="5" name="Google Shape;348;p64" hidden="0"/>
+          <p:cNvSpPr/>
+          <p:nvPr isPhoto="0" userDrawn="0"/>
+        </p:nvSpPr>
+        <p:spPr bwMode="auto">
+          <a:xfrm>
+            <a:off x="162000" y="85680"/>
+            <a:ext cx="7228440" cy="351360"/>
+          </a:xfrm>
+          <a:prstGeom prst="rect">
+            <a:avLst/>
+          </a:prstGeom>
+          <a:noFill/>
+          <a:ln>
+            <a:noFill/>
+          </a:ln>
+        </p:spPr>
+        <p:txBody>
+          <a:bodyPr spcFirstLastPara="1" wrap="square" lIns="91422" tIns="91422" rIns="91422" bIns="91422" anchor="ctr" anchorCtr="0">
+            <a:noAutofit/>
+          </a:bodyPr>
+          <a:lstStyle/>
+          <a:p>
+            <a:pPr marL="0" lvl="0" indent="0" algn="l">
+              <a:spcBef>
+                <a:spcPts val="0"/>
+              </a:spcBef>
+              <a:spcAft>
+                <a:spcPts val="0"/>
+              </a:spcAft>
+              <a:buNone/>
+              <a:defRPr/>
+            </a:pPr>
+            <a:endParaRPr/>
+          </a:p>
+        </p:txBody>
+      </p:sp>
+      <p:sp>
+        <p:nvSpPr>
+          <p:cNvPr id="6" name="Google Shape;349;p64" hidden="0"/>
+          <p:cNvSpPr/>
+          <p:nvPr isPhoto="0" userDrawn="0"/>
+        </p:nvSpPr>
+        <p:spPr bwMode="auto">
+          <a:xfrm>
+            <a:off x="84240" y="6402240"/>
+            <a:ext cx="640440" cy="363960"/>
+          </a:xfrm>
+          <a:prstGeom prst="rect">
+            <a:avLst/>
+          </a:prstGeom>
+          <a:noFill/>
+          <a:ln>
+            <a:noFill/>
+          </a:ln>
+        </p:spPr>
+        <p:txBody>
+          <a:bodyPr spcFirstLastPara="1" wrap="square" lIns="90000" tIns="45000" rIns="90000" bIns="45000" anchor="ctr" anchorCtr="0">
+            <a:noAutofit/>
+          </a:bodyPr>
+          <a:lstStyle/>
+          <a:p>
+            <a:pPr marL="0" marR="0" lvl="0" indent="0" algn="r">
+              <a:lnSpc>
+                <a:spcPct val="100000"/>
+              </a:lnSpc>
+              <a:spcBef>
+                <a:spcPts val="0"/>
+              </a:spcBef>
+              <a:spcAft>
+                <a:spcPts val="0"/>
+              </a:spcAft>
+              <a:buNone/>
+              <a:defRPr/>
+            </a:pPr>
+            <a:fld id="{FAAB1641-A434-2BA9-7C1D-5CC681E9994B}" type="slidenum">
+              <a:rPr lang="pt-BR" sz="1000" b="0" i="0" u="none" strike="noStrike" cap="none">
+                <a:solidFill>
+                  <a:srgbClr val="B2B2B2"/>
+                </a:solidFill>
+                <a:latin typeface="Verdana"/>
+                <a:ea typeface="Verdana"/>
+                <a:cs typeface="Verdana"/>
+              </a:rPr>
+              <a:t/>
+            </a:fld>
+            <a:endParaRPr sz="1000" b="0" i="0" u="none" strike="noStrike" cap="none">
+              <a:solidFill>
+                <a:schemeClr val="dk1"/>
+              </a:solidFill>
+              <a:latin typeface="Arial"/>
+              <a:ea typeface="Arial"/>
+              <a:cs typeface="Arial"/>
+            </a:endParaRPr>
+          </a:p>
+        </p:txBody>
+      </p:sp>
+      <p:sp>
+        <p:nvSpPr>
+          <p:cNvPr id="7" name="" hidden="0"/>
+          <p:cNvSpPr/>
+          <p:nvPr isPhoto="0" userDrawn="0"/>
+        </p:nvSpPr>
+        <p:spPr bwMode="auto">
+          <a:xfrm flipH="0" flipV="0">
+            <a:off x="724674" y="4088421"/>
+            <a:ext cx="8137928" cy="363447"/>
+          </a:xfrm>
+          <a:prstGeom prst="rect">
+            <a:avLst/>
+          </a:prstGeom>
+          <a:noFill/>
+        </p:spPr>
+        <p:txBody>
+          <a:bodyPr vertOverflow="overflow" horzOverflow="clip" vert="horz" wrap="square" lIns="91440" tIns="45720" rIns="91440" bIns="45720" numCol="1" spcCol="0" rtlCol="0" fromWordArt="0" anchor="t" anchorCtr="0" forceAA="0" upright="0" compatLnSpc="0">
+            <a:noAutofit/>
+          </a:bodyPr>
+          <a:p>
+            <a:pPr>
+              <a:defRPr/>
+            </a:pPr>
+            <a:r>
+              <a:rPr sz="2000" b="1"/>
+              <a:t>Primeiro contato com OpenMP</a:t>
+            </a:r>
+            <a:endParaRPr sz="2000" b="1"/>
+          </a:p>
+          <a:p>
+            <a:pPr>
+              <a:defRPr/>
+            </a:pPr>
+            <a:endParaRPr sz="2000"/>
+          </a:p>
+          <a:p>
+            <a:pPr marL="305901" indent="-305901">
+              <a:buAutoNum type="arabicPeriod"/>
+              <a:defRPr/>
+            </a:pPr>
+            <a:r>
+              <a:rPr lang="pt-BR" sz="2000" b="0" i="0" u="none" strike="noStrike" cap="none" spc="0">
+                <a:solidFill>
+                  <a:srgbClr val="000000"/>
+                </a:solidFill>
+                <a:latin typeface="Arial"/>
+                <a:ea typeface="Arial"/>
+                <a:cs typeface="Arial"/>
+              </a:rPr>
+              <a:t>Executar código paralelo em CPU</a:t>
+            </a:r>
+            <a:endParaRPr sz="2000" b="0"/>
+          </a:p>
+          <a:p>
+            <a:pPr marL="305901" indent="-305901">
+              <a:buAutoNum type="arabicPeriod"/>
+              <a:defRPr/>
+            </a:pPr>
+            <a:r>
+              <a:rPr sz="2000" b="0"/>
+              <a:t>API do OpenMP para trabalhar com regiões paralelas e tarefas</a:t>
+            </a:r>
+            <a:endParaRPr sz="2000" b="0"/>
+          </a:p>
+          <a:p>
+            <a:pPr marL="305900" indent="-305900">
+              <a:buAutoNum type="arabicPeriod"/>
+              <a:defRPr/>
+            </a:pPr>
+            <a:endParaRPr sz="2000" b="0"/>
+          </a:p>
+        </p:txBody>
+      </p:sp>
+    </p:spTree>
+  </p:cSld>
+  <p:clrMapOvr>
+    <a:masterClrMapping/>
+  </p:clrMapOvr>
+  <mc:AlternateContent xmlns:mc="http://schemas.openxmlformats.org/markup-compatibility/2006">
+    <mc:Choice xmlns:p14="http://schemas.microsoft.com/office/powerpoint/2010/main" Requires="p14">
+      <p:transition p14:dur="2000" advClick="1"/>
+    </mc:Choice>
+    <mc:Fallback>
+      <p:transition advClick="1"/>
+    </mc:Fallback>
+  </mc:AlternateContent>
+</p:sld>
+</file>
+
+<file path=ppt/slides/slide28.xml><?xml version="1.0" encoding="utf-8"?>
+<p:sld xmlns:a="http://schemas.openxmlformats.org/drawingml/2006/main" xmlns:r="http://schemas.openxmlformats.org/officeDocument/2006/relationships" xmlns:p="http://schemas.openxmlformats.org/presentationml/2006/main" xmlns:m="http://schemas.openxmlformats.org/officeDocument/2006/math" xmlns:w="http://schemas.openxmlformats.org/wordprocessingml/2006/main" showMasterPhAnim="0" show="1">
+  <p:cSld name="">
     <p:bg>
       <p:bgPr shadeToTitle="0">
         <a:solidFill>

</xml_diff>